<commit_message>
"modify intro to op"
</commit_message>
<xml_diff>
--- a/Platform Technologies/Pre Lim/Lecture/Chapter1_Introduction_to_OS.pptx
+++ b/Platform Technologies/Pre Lim/Lecture/Chapter1_Introduction_to_OS.pptx
@@ -19134,7 +19134,7 @@
           <a:p>
             <a:fld id="{5D225DAC-D7F7-4CE3-B22F-689EBE1F0F09}" type="datetimeFigureOut">
               <a:rPr lang="en-US" smtClean="0"/>
-              <a:t>7/17/2025</a:t>
+              <a:t>7/18/2025</a:t>
             </a:fld>
             <a:endParaRPr lang="en-US"/>
           </a:p>
@@ -19445,10 +19445,7 @@
           <a:bodyPr/>
           <a:lstStyle/>
           <a:p>
-            <a:r>
-              <a:rPr lang="en-US" dirty="0"/>
-              <a:t>"In this chapter, we’ll explore what an Operating System is, its history, the different types of OS, and how we can install one using VirtualBox. This will help us understand the foundation of every computing system."</a:t>
-            </a:r>
+            <a:endParaRPr lang="en-US" dirty="0"/>
           </a:p>
         </p:txBody>
       </p:sp>
@@ -19488,7 +19485,198 @@
 </p:notes>
 </file>
 
+<file path=ppt/notesSlides/notesSlide10.xml><?xml version="1.0" encoding="utf-8"?>
+<p:notes xmlns:a="http://schemas.openxmlformats.org/drawingml/2006/main" xmlns:r="http://schemas.openxmlformats.org/officeDocument/2006/relationships" xmlns:p="http://schemas.openxmlformats.org/presentationml/2006/main">
+  <p:cSld>
+    <p:spTree>
+      <p:nvGrpSpPr>
+        <p:cNvPr id="1" name=""/>
+        <p:cNvGrpSpPr/>
+        <p:nvPr/>
+      </p:nvGrpSpPr>
+      <p:grpSpPr>
+        <a:xfrm>
+          <a:off x="0" y="0"/>
+          <a:ext cx="0" cy="0"/>
+          <a:chOff x="0" y="0"/>
+          <a:chExt cx="0" cy="0"/>
+        </a:xfrm>
+      </p:grpSpPr>
+      <p:sp>
+        <p:nvSpPr>
+          <p:cNvPr id="2" name="Slide Image Placeholder 1"/>
+          <p:cNvSpPr>
+            <a:spLocks noGrp="1" noRot="1" noChangeAspect="1"/>
+          </p:cNvSpPr>
+          <p:nvPr>
+            <p:ph type="sldImg"/>
+          </p:nvPr>
+        </p:nvSpPr>
+        <p:spPr/>
+      </p:sp>
+      <p:sp>
+        <p:nvSpPr>
+          <p:cNvPr id="3" name="Notes Placeholder 2"/>
+          <p:cNvSpPr>
+            <a:spLocks noGrp="1"/>
+          </p:cNvSpPr>
+          <p:nvPr>
+            <p:ph type="body" idx="1"/>
+          </p:nvPr>
+        </p:nvSpPr>
+        <p:spPr/>
+        <p:txBody>
+          <a:bodyPr/>
+          <a:lstStyle/>
+          <a:p>
+            <a:endParaRPr lang="en-US" dirty="0"/>
+          </a:p>
+        </p:txBody>
+      </p:sp>
+      <p:sp>
+        <p:nvSpPr>
+          <p:cNvPr id="4" name="Slide Number Placeholder 3"/>
+          <p:cNvSpPr>
+            <a:spLocks noGrp="1"/>
+          </p:cNvSpPr>
+          <p:nvPr>
+            <p:ph type="sldNum" sz="quarter" idx="5"/>
+          </p:nvPr>
+        </p:nvSpPr>
+        <p:spPr/>
+        <p:txBody>
+          <a:bodyPr/>
+          <a:lstStyle/>
+          <a:p>
+            <a:fld id="{0FA2C36E-4514-46D1-9D76-0A014263E463}" type="slidenum">
+              <a:rPr lang="en-US" smtClean="0"/>
+              <a:t>10</a:t>
+            </a:fld>
+            <a:endParaRPr lang="en-US"/>
+          </a:p>
+        </p:txBody>
+      </p:sp>
+    </p:spTree>
+    <p:extLst>
+      <p:ext uri="{BB962C8B-B14F-4D97-AF65-F5344CB8AC3E}">
+        <p14:creationId xmlns:p14="http://schemas.microsoft.com/office/powerpoint/2010/main" val="1202224300"/>
+      </p:ext>
+    </p:extLst>
+  </p:cSld>
+  <p:clrMapOvr>
+    <a:masterClrMapping/>
+  </p:clrMapOvr>
+</p:notes>
+</file>
+
 <file path=ppt/notesSlides/notesSlide2.xml><?xml version="1.0" encoding="utf-8"?>
+<p:notes xmlns:a="http://schemas.openxmlformats.org/drawingml/2006/main" xmlns:r="http://schemas.openxmlformats.org/officeDocument/2006/relationships" xmlns:p="http://schemas.openxmlformats.org/presentationml/2006/main">
+  <p:cSld>
+    <p:spTree>
+      <p:nvGrpSpPr>
+        <p:cNvPr id="1" name=""/>
+        <p:cNvGrpSpPr/>
+        <p:nvPr/>
+      </p:nvGrpSpPr>
+      <p:grpSpPr>
+        <a:xfrm>
+          <a:off x="0" y="0"/>
+          <a:ext cx="0" cy="0"/>
+          <a:chOff x="0" y="0"/>
+          <a:chExt cx="0" cy="0"/>
+        </a:xfrm>
+      </p:grpSpPr>
+      <p:sp>
+        <p:nvSpPr>
+          <p:cNvPr id="2" name="Slide Image Placeholder 1"/>
+          <p:cNvSpPr>
+            <a:spLocks noGrp="1" noRot="1" noChangeAspect="1"/>
+          </p:cNvSpPr>
+          <p:nvPr>
+            <p:ph type="sldImg"/>
+          </p:nvPr>
+        </p:nvSpPr>
+        <p:spPr/>
+      </p:sp>
+      <p:sp>
+        <p:nvSpPr>
+          <p:cNvPr id="3" name="Notes Placeholder 2"/>
+          <p:cNvSpPr>
+            <a:spLocks noGrp="1"/>
+          </p:cNvSpPr>
+          <p:nvPr>
+            <p:ph type="body" idx="1"/>
+          </p:nvPr>
+        </p:nvSpPr>
+        <p:spPr/>
+        <p:txBody>
+          <a:bodyPr/>
+          <a:lstStyle/>
+          <a:p>
+            <a:pPr marL="0" marR="0" lvl="0" indent="0" algn="l" defTabSz="914400" rtl="0" eaLnBrk="1" fontAlgn="auto" latinLnBrk="0" hangingPunct="1">
+              <a:lnSpc>
+                <a:spcPct val="100000"/>
+              </a:lnSpc>
+              <a:spcBef>
+                <a:spcPts val="0"/>
+              </a:spcBef>
+              <a:spcAft>
+                <a:spcPts val="0"/>
+              </a:spcAft>
+              <a:buClrTx/>
+              <a:buSzTx/>
+              <a:buFontTx/>
+              <a:buNone/>
+              <a:tabLst/>
+              <a:defRPr/>
+            </a:pPr>
+            <a:r>
+              <a:rPr lang="en-US" dirty="0"/>
+              <a:t>"In this chapter, we’ll explore what an Operating System is, its history, the different types of OS, and how we can install one using VirtualBox. This will help us understand the foundation of every computing system."</a:t>
+            </a:r>
+          </a:p>
+          <a:p>
+            <a:endParaRPr lang="en-US" dirty="0"/>
+          </a:p>
+        </p:txBody>
+      </p:sp>
+      <p:sp>
+        <p:nvSpPr>
+          <p:cNvPr id="4" name="Slide Number Placeholder 3"/>
+          <p:cNvSpPr>
+            <a:spLocks noGrp="1"/>
+          </p:cNvSpPr>
+          <p:nvPr>
+            <p:ph type="sldNum" sz="quarter" idx="5"/>
+          </p:nvPr>
+        </p:nvSpPr>
+        <p:spPr/>
+        <p:txBody>
+          <a:bodyPr/>
+          <a:lstStyle/>
+          <a:p>
+            <a:fld id="{0FA2C36E-4514-46D1-9D76-0A014263E463}" type="slidenum">
+              <a:rPr lang="en-US" smtClean="0"/>
+              <a:t>2</a:t>
+            </a:fld>
+            <a:endParaRPr lang="en-US"/>
+          </a:p>
+        </p:txBody>
+      </p:sp>
+    </p:spTree>
+    <p:extLst>
+      <p:ext uri="{BB962C8B-B14F-4D97-AF65-F5344CB8AC3E}">
+        <p14:creationId xmlns:p14="http://schemas.microsoft.com/office/powerpoint/2010/main" val="943223065"/>
+      </p:ext>
+    </p:extLst>
+  </p:cSld>
+  <p:clrMapOvr>
+    <a:masterClrMapping/>
+  </p:clrMapOvr>
+</p:notes>
+</file>
+
+<file path=ppt/notesSlides/notesSlide3.xml><?xml version="1.0" encoding="utf-8"?>
 <p:notes xmlns:a="http://schemas.openxmlformats.org/drawingml/2006/main" xmlns:r="http://schemas.openxmlformats.org/officeDocument/2006/relationships" xmlns:p="http://schemas.openxmlformats.org/presentationml/2006/main">
   <p:cSld>
     <p:spTree>
@@ -19575,7 +19763,7 @@
 </p:notes>
 </file>
 
-<file path=ppt/notesSlides/notesSlide3.xml><?xml version="1.0" encoding="utf-8"?>
+<file path=ppt/notesSlides/notesSlide4.xml><?xml version="1.0" encoding="utf-8"?>
 <p:notes xmlns:a="http://schemas.openxmlformats.org/drawingml/2006/main" xmlns:r="http://schemas.openxmlformats.org/officeDocument/2006/relationships" xmlns:p="http://schemas.openxmlformats.org/presentationml/2006/main">
   <p:cSld>
     <p:spTree>
@@ -19662,7 +19850,7 @@
 </p:notes>
 </file>
 
-<file path=ppt/notesSlides/notesSlide4.xml><?xml version="1.0" encoding="utf-8"?>
+<file path=ppt/notesSlides/notesSlide5.xml><?xml version="1.0" encoding="utf-8"?>
 <p:notes xmlns:a="http://schemas.openxmlformats.org/drawingml/2006/main" xmlns:r="http://schemas.openxmlformats.org/officeDocument/2006/relationships" xmlns:p="http://schemas.openxmlformats.org/presentationml/2006/main">
   <p:cSld>
     <p:spTree>
@@ -19749,7 +19937,7 @@
 </p:notes>
 </file>
 
-<file path=ppt/notesSlides/notesSlide5.xml><?xml version="1.0" encoding="utf-8"?>
+<file path=ppt/notesSlides/notesSlide6.xml><?xml version="1.0" encoding="utf-8"?>
 <p:notes xmlns:a="http://schemas.openxmlformats.org/drawingml/2006/main" xmlns:r="http://schemas.openxmlformats.org/officeDocument/2006/relationships" xmlns:p="http://schemas.openxmlformats.org/presentationml/2006/main">
   <p:cSld>
     <p:spTree>
@@ -19930,7 +20118,7 @@
 </p:notes>
 </file>
 
-<file path=ppt/notesSlides/notesSlide6.xml><?xml version="1.0" encoding="utf-8"?>
+<file path=ppt/notesSlides/notesSlide7.xml><?xml version="1.0" encoding="utf-8"?>
 <p:notes xmlns:a="http://schemas.openxmlformats.org/drawingml/2006/main" xmlns:r="http://schemas.openxmlformats.org/officeDocument/2006/relationships" xmlns:p="http://schemas.openxmlformats.org/presentationml/2006/main">
   <p:cSld>
     <p:spTree>
@@ -20131,7 +20319,7 @@
 </p:notes>
 </file>
 
-<file path=ppt/notesSlides/notesSlide7.xml><?xml version="1.0" encoding="utf-8"?>
+<file path=ppt/notesSlides/notesSlide8.xml><?xml version="1.0" encoding="utf-8"?>
 <p:notes xmlns:a="http://schemas.openxmlformats.org/drawingml/2006/main" xmlns:r="http://schemas.openxmlformats.org/officeDocument/2006/relationships" xmlns:p="http://schemas.openxmlformats.org/presentationml/2006/main">
   <p:cSld>
     <p:spTree>
@@ -20293,7 +20481,7 @@
 </p:notes>
 </file>
 
-<file path=ppt/notesSlides/notesSlide8.xml><?xml version="1.0" encoding="utf-8"?>
+<file path=ppt/notesSlides/notesSlide9.xml><?xml version="1.0" encoding="utf-8"?>
 <p:notes xmlns:a="http://schemas.openxmlformats.org/drawingml/2006/main" xmlns:r="http://schemas.openxmlformats.org/officeDocument/2006/relationships" xmlns:p="http://schemas.openxmlformats.org/presentationml/2006/main">
   <p:cSld>
     <p:spTree>
@@ -20446,90 +20634,6 @@
     <p:extLst>
       <p:ext uri="{BB962C8B-B14F-4D97-AF65-F5344CB8AC3E}">
         <p14:creationId xmlns:p14="http://schemas.microsoft.com/office/powerpoint/2010/main" val="4275642365"/>
-      </p:ext>
-    </p:extLst>
-  </p:cSld>
-  <p:clrMapOvr>
-    <a:masterClrMapping/>
-  </p:clrMapOvr>
-</p:notes>
-</file>
-
-<file path=ppt/notesSlides/notesSlide9.xml><?xml version="1.0" encoding="utf-8"?>
-<p:notes xmlns:a="http://schemas.openxmlformats.org/drawingml/2006/main" xmlns:r="http://schemas.openxmlformats.org/officeDocument/2006/relationships" xmlns:p="http://schemas.openxmlformats.org/presentationml/2006/main">
-  <p:cSld>
-    <p:spTree>
-      <p:nvGrpSpPr>
-        <p:cNvPr id="1" name=""/>
-        <p:cNvGrpSpPr/>
-        <p:nvPr/>
-      </p:nvGrpSpPr>
-      <p:grpSpPr>
-        <a:xfrm>
-          <a:off x="0" y="0"/>
-          <a:ext cx="0" cy="0"/>
-          <a:chOff x="0" y="0"/>
-          <a:chExt cx="0" cy="0"/>
-        </a:xfrm>
-      </p:grpSpPr>
-      <p:sp>
-        <p:nvSpPr>
-          <p:cNvPr id="2" name="Slide Image Placeholder 1"/>
-          <p:cNvSpPr>
-            <a:spLocks noGrp="1" noRot="1" noChangeAspect="1"/>
-          </p:cNvSpPr>
-          <p:nvPr>
-            <p:ph type="sldImg"/>
-          </p:nvPr>
-        </p:nvSpPr>
-        <p:spPr/>
-      </p:sp>
-      <p:sp>
-        <p:nvSpPr>
-          <p:cNvPr id="3" name="Notes Placeholder 2"/>
-          <p:cNvSpPr>
-            <a:spLocks noGrp="1"/>
-          </p:cNvSpPr>
-          <p:nvPr>
-            <p:ph type="body" idx="1"/>
-          </p:nvPr>
-        </p:nvSpPr>
-        <p:spPr/>
-        <p:txBody>
-          <a:bodyPr/>
-          <a:lstStyle/>
-          <a:p>
-            <a:endParaRPr lang="en-US" dirty="0"/>
-          </a:p>
-        </p:txBody>
-      </p:sp>
-      <p:sp>
-        <p:nvSpPr>
-          <p:cNvPr id="4" name="Slide Number Placeholder 3"/>
-          <p:cNvSpPr>
-            <a:spLocks noGrp="1"/>
-          </p:cNvSpPr>
-          <p:nvPr>
-            <p:ph type="sldNum" sz="quarter" idx="5"/>
-          </p:nvPr>
-        </p:nvSpPr>
-        <p:spPr/>
-        <p:txBody>
-          <a:bodyPr/>
-          <a:lstStyle/>
-          <a:p>
-            <a:fld id="{0FA2C36E-4514-46D1-9D76-0A014263E463}" type="slidenum">
-              <a:rPr lang="en-US" smtClean="0"/>
-              <a:t>10</a:t>
-            </a:fld>
-            <a:endParaRPr lang="en-US"/>
-          </a:p>
-        </p:txBody>
-      </p:sp>
-    </p:spTree>
-    <p:extLst>
-      <p:ext uri="{BB962C8B-B14F-4D97-AF65-F5344CB8AC3E}">
-        <p14:creationId xmlns:p14="http://schemas.microsoft.com/office/powerpoint/2010/main" val="1202224300"/>
       </p:ext>
     </p:extLst>
   </p:cSld>
@@ -20718,7 +20822,7 @@
           <a:p>
             <a:fld id="{5BCAD085-E8A6-8845-BD4E-CB4CCA059FC4}" type="datetimeFigureOut">
               <a:rPr lang="en-US" smtClean="0"/>
-              <a:t>7/17/2025</a:t>
+              <a:t>7/18/2025</a:t>
             </a:fld>
             <a:endParaRPr lang="en-US"/>
           </a:p>
@@ -20886,7 +20990,7 @@
           <a:p>
             <a:fld id="{5BCAD085-E8A6-8845-BD4E-CB4CCA059FC4}" type="datetimeFigureOut">
               <a:rPr lang="en-US" smtClean="0"/>
-              <a:t>7/17/2025</a:t>
+              <a:t>7/18/2025</a:t>
             </a:fld>
             <a:endParaRPr lang="en-US"/>
           </a:p>
@@ -21064,7 +21168,7 @@
           <a:p>
             <a:fld id="{5BCAD085-E8A6-8845-BD4E-CB4CCA059FC4}" type="datetimeFigureOut">
               <a:rPr lang="en-US" smtClean="0"/>
-              <a:t>7/17/2025</a:t>
+              <a:t>7/18/2025</a:t>
             </a:fld>
             <a:endParaRPr lang="en-US"/>
           </a:p>
@@ -21232,7 +21336,7 @@
           <a:p>
             <a:fld id="{5BCAD085-E8A6-8845-BD4E-CB4CCA059FC4}" type="datetimeFigureOut">
               <a:rPr lang="en-US" smtClean="0"/>
-              <a:t>7/17/2025</a:t>
+              <a:t>7/18/2025</a:t>
             </a:fld>
             <a:endParaRPr lang="en-US"/>
           </a:p>
@@ -21477,7 +21581,7 @@
           <a:p>
             <a:fld id="{5BCAD085-E8A6-8845-BD4E-CB4CCA059FC4}" type="datetimeFigureOut">
               <a:rPr lang="en-US" smtClean="0"/>
-              <a:t>7/17/2025</a:t>
+              <a:t>7/18/2025</a:t>
             </a:fld>
             <a:endParaRPr lang="en-US"/>
           </a:p>
@@ -21762,7 +21866,7 @@
           <a:p>
             <a:fld id="{5BCAD085-E8A6-8845-BD4E-CB4CCA059FC4}" type="datetimeFigureOut">
               <a:rPr lang="en-US" smtClean="0"/>
-              <a:t>7/17/2025</a:t>
+              <a:t>7/18/2025</a:t>
             </a:fld>
             <a:endParaRPr lang="en-US"/>
           </a:p>
@@ -22181,7 +22285,7 @@
           <a:p>
             <a:fld id="{5BCAD085-E8A6-8845-BD4E-CB4CCA059FC4}" type="datetimeFigureOut">
               <a:rPr lang="en-US" smtClean="0"/>
-              <a:t>7/17/2025</a:t>
+              <a:t>7/18/2025</a:t>
             </a:fld>
             <a:endParaRPr lang="en-US"/>
           </a:p>
@@ -22298,7 +22402,7 @@
           <a:p>
             <a:fld id="{5BCAD085-E8A6-8845-BD4E-CB4CCA059FC4}" type="datetimeFigureOut">
               <a:rPr lang="en-US" smtClean="0"/>
-              <a:t>7/17/2025</a:t>
+              <a:t>7/18/2025</a:t>
             </a:fld>
             <a:endParaRPr lang="en-US"/>
           </a:p>
@@ -22393,7 +22497,7 @@
           <a:p>
             <a:fld id="{5BCAD085-E8A6-8845-BD4E-CB4CCA059FC4}" type="datetimeFigureOut">
               <a:rPr lang="en-US" smtClean="0"/>
-              <a:t>7/17/2025</a:t>
+              <a:t>7/18/2025</a:t>
             </a:fld>
             <a:endParaRPr lang="en-US"/>
           </a:p>
@@ -22668,7 +22772,7 @@
           <a:p>
             <a:fld id="{5BCAD085-E8A6-8845-BD4E-CB4CCA059FC4}" type="datetimeFigureOut">
               <a:rPr lang="en-US" smtClean="0"/>
-              <a:t>7/17/2025</a:t>
+              <a:t>7/18/2025</a:t>
             </a:fld>
             <a:endParaRPr lang="en-US"/>
           </a:p>
@@ -22920,7 +23024,7 @@
           <a:p>
             <a:fld id="{5BCAD085-E8A6-8845-BD4E-CB4CCA059FC4}" type="datetimeFigureOut">
               <a:rPr lang="en-US" smtClean="0"/>
-              <a:t>7/17/2025</a:t>
+              <a:t>7/18/2025</a:t>
             </a:fld>
             <a:endParaRPr lang="en-US"/>
           </a:p>
@@ -23131,7 +23235,7 @@
           <a:p>
             <a:fld id="{5BCAD085-E8A6-8845-BD4E-CB4CCA059FC4}" type="datetimeFigureOut">
               <a:rPr lang="en-US" smtClean="0"/>
-              <a:t>7/17/2025</a:t>
+              <a:t>7/18/2025</a:t>
             </a:fld>
             <a:endParaRPr lang="en-US"/>
           </a:p>

</xml_diff>